<commit_message>
Update diagrams to be more general.
</commit_message>
<xml_diff>
--- a/docs/diagrams/ByNameCommandSequenceDiagram.pptx
+++ b/docs/diagrams/ByNameCommandSequenceDiagram.pptx
@@ -4078,7 +4078,7 @@
                   <a:srgbClr val="0070C0"/>
                 </a:solidFill>
               </a:rPr>
-              <a:t>&gt; &lt;preamble&gt; p/83838383”)</a:t>
+              <a:t>&gt; &lt;preamble&gt; &lt;arguments&gt;”)</a:t>
             </a:r>
           </a:p>
         </p:txBody>
@@ -4205,8 +4205,8 @@
         </p:nvSpPr>
         <p:spPr>
           <a:xfrm>
-            <a:off x="821407" y="1105064"/>
-            <a:ext cx="1899551" cy="523220"/>
+            <a:off x="1059753" y="1143450"/>
+            <a:ext cx="1899551" cy="677108"/>
           </a:xfrm>
           <a:prstGeom prst="rect">
             <a:avLst/>
@@ -4250,18 +4250,17 @@
             </a:r>
             <a:r>
               <a:rPr lang="en-US" sz="1000" dirty="0"/>
-              <a:t>&gt; &lt;preamble&gt; </a:t>
+              <a:t>&gt; &lt;preamble&gt;</a:t>
             </a:r>
           </a:p>
           <a:p>
             <a:r>
               <a:rPr lang="en-US" sz="1000" dirty="0"/>
-              <a:t>p/83838383”</a:t>
-            </a:r>
-            <a:r>
-              <a:rPr lang="en-US" dirty="0"/>
-              <a:t>)</a:t>
-            </a:r>
+              <a:t>&lt;arguments&gt;”)</a:t>
+            </a:r>
+          </a:p>
+          <a:p>
+            <a:endParaRPr lang="en-US" dirty="0"/>
           </a:p>
         </p:txBody>
       </p:sp>

</xml_diff>

<commit_message>
Update the By Name Command Class Diagram.
</commit_message>
<xml_diff>
--- a/docs/diagrams/ByNameCommandSequenceDiagram.pptx
+++ b/docs/diagrams/ByNameCommandSequenceDiagram.pptx
@@ -3444,14 +3444,67 @@
       </p:grpSpPr>
       <p:sp>
         <p:nvSpPr>
+          <p:cNvPr id="101" name="Rectangle 100">
+            <a:extLst>
+              <a:ext uri="{FF2B5EF4-FFF2-40B4-BE49-F238E27FC236}">
+                <a16:creationId xmlns:a16="http://schemas.microsoft.com/office/drawing/2014/main" id="{0A249BCB-B5C1-D44A-BFB7-7C78425A4713}"/>
+              </a:ext>
+            </a:extLst>
+          </p:cNvPr>
+          <p:cNvSpPr/>
+          <p:nvPr/>
+        </p:nvSpPr>
+        <p:spPr>
+          <a:xfrm>
+            <a:off x="6300954" y="3293017"/>
+            <a:ext cx="158326" cy="591782"/>
+          </a:xfrm>
+          <a:prstGeom prst="rect">
+            <a:avLst/>
+          </a:prstGeom>
+          <a:solidFill>
+            <a:srgbClr val="0070C0"/>
+          </a:solidFill>
+          <a:ln>
+            <a:solidFill>
+              <a:srgbClr val="0070C0"/>
+            </a:solidFill>
+          </a:ln>
+          <a:effectLst/>
+        </p:spPr>
+        <p:style>
+          <a:lnRef idx="1">
+            <a:schemeClr val="accent3"/>
+          </a:lnRef>
+          <a:fillRef idx="2">
+            <a:schemeClr val="accent3"/>
+          </a:fillRef>
+          <a:effectRef idx="1">
+            <a:schemeClr val="accent3"/>
+          </a:effectRef>
+          <a:fontRef idx="minor">
+            <a:schemeClr val="dk1"/>
+          </a:fontRef>
+        </p:style>
+        <p:txBody>
+          <a:bodyPr rtlCol="0" anchor="ctr"/>
+          <a:lstStyle/>
+          <a:p>
+            <a:pPr algn="ctr"/>
+            <a:endParaRPr lang="en-SG" sz="1400"/>
+          </a:p>
+        </p:txBody>
+      </p:sp>
+      <p:sp>
+        <p:nvSpPr>
           <p:cNvPr id="81" name="Rectangle 65"/>
           <p:cNvSpPr/>
           <p:nvPr/>
         </p:nvSpPr>
         <p:spPr>
           <a:xfrm>
-            <a:off x="422039" y="189496"/>
-            <a:ext cx="7769448" cy="5625463"/>
+            <a:off x="379681" y="115757"/>
+            <a:ext cx="7769448" cy="6361231"/>
           </a:xfrm>
           <a:prstGeom prst="roundRect">
             <a:avLst>
@@ -3517,8 +3570,8 @@
         </p:nvSpPr>
         <p:spPr>
           <a:xfrm>
-            <a:off x="953256" y="2182591"/>
-            <a:ext cx="6982860" cy="2863630"/>
+            <a:off x="953256" y="2961347"/>
+            <a:ext cx="6982860" cy="2465874"/>
           </a:xfrm>
           <a:prstGeom prst="rect">
             <a:avLst/>
@@ -3638,13 +3691,14 @@
           <p:cNvPr id="5" name="Straight Connector 4"/>
           <p:cNvCxnSpPr>
             <a:cxnSpLocks/>
+            <a:stCxn id="2" idx="2"/>
           </p:cNvCxnSpPr>
           <p:nvPr/>
         </p:nvCxnSpPr>
         <p:spPr>
           <a:xfrm>
-            <a:off x="1610959" y="907617"/>
-            <a:ext cx="0" cy="4731183"/>
+            <a:off x="1610960" y="977196"/>
+            <a:ext cx="0" cy="5042604"/>
           </a:xfrm>
           <a:prstGeom prst="line">
             <a:avLst/>
@@ -3680,8 +3734,8 @@
         </p:nvSpPr>
         <p:spPr>
           <a:xfrm>
-            <a:off x="1538951" y="1512339"/>
-            <a:ext cx="131886" cy="3897857"/>
+            <a:off x="1538951" y="1430779"/>
+            <a:ext cx="105682" cy="4360417"/>
           </a:xfrm>
           <a:prstGeom prst="rect">
             <a:avLst/>
@@ -3727,7 +3781,7 @@
         </p:nvSpPr>
         <p:spPr>
           <a:xfrm>
-            <a:off x="2685234" y="437662"/>
+            <a:off x="2673288" y="1295400"/>
             <a:ext cx="1412967" cy="467684"/>
           </a:xfrm>
           <a:prstGeom prst="rect">
@@ -3812,8 +3866,8 @@
         </p:nvCxnSpPr>
         <p:spPr>
           <a:xfrm>
-            <a:off x="3402887" y="907617"/>
-            <a:ext cx="0" cy="4564862"/>
+            <a:off x="3402887" y="1785049"/>
+            <a:ext cx="0" cy="4068430"/>
           </a:xfrm>
           <a:prstGeom prst="line">
             <a:avLst/>
@@ -3849,8 +3903,8 @@
         </p:nvSpPr>
         <p:spPr>
           <a:xfrm>
-            <a:off x="3302658" y="1605810"/>
-            <a:ext cx="154228" cy="3631737"/>
+            <a:off x="3302659" y="2328795"/>
+            <a:ext cx="174884" cy="3289751"/>
           </a:xfrm>
           <a:prstGeom prst="rect">
             <a:avLst/>
@@ -3902,8 +3956,8 @@
         </p:nvCxnSpPr>
         <p:spPr>
           <a:xfrm>
-            <a:off x="4954382" y="1055764"/>
-            <a:ext cx="0" cy="4583036"/>
+            <a:off x="4954382" y="1817790"/>
+            <a:ext cx="0" cy="4202010"/>
           </a:xfrm>
           <a:prstGeom prst="line">
             <a:avLst/>
@@ -3939,7 +3993,7 @@
         </p:nvSpPr>
         <p:spPr>
           <a:xfrm>
-            <a:off x="4875814" y="1668060"/>
+            <a:off x="4875814" y="2499591"/>
             <a:ext cx="207770" cy="319809"/>
           </a:xfrm>
           <a:prstGeom prst="rect">
@@ -3986,7 +4040,7 @@
         </p:nvCxnSpPr>
         <p:spPr>
           <a:xfrm>
-            <a:off x="419100" y="1531326"/>
+            <a:off x="419100" y="1447800"/>
             <a:ext cx="1119851" cy="0"/>
           </a:xfrm>
           <a:prstGeom prst="straightConnector1">
@@ -4022,7 +4076,7 @@
         </p:nvSpPr>
         <p:spPr>
           <a:xfrm>
-            <a:off x="-4452" y="1055764"/>
+            <a:off x="-4452" y="990600"/>
             <a:ext cx="1424846" cy="461665"/>
           </a:xfrm>
           <a:prstGeom prst="rect">
@@ -4092,9 +4146,9 @@
           <p:nvPr/>
         </p:nvCxnSpPr>
         <p:spPr>
-          <a:xfrm flipV="1">
-            <a:off x="3488273" y="1671555"/>
-            <a:ext cx="1411847" cy="1"/>
+          <a:xfrm>
+            <a:off x="3379772" y="2507931"/>
+            <a:ext cx="1520348" cy="0"/>
           </a:xfrm>
           <a:prstGeom prst="straightConnector1">
             <a:avLst/>
@@ -4129,7 +4183,7 @@
         </p:nvCxnSpPr>
         <p:spPr>
           <a:xfrm>
-            <a:off x="3461408" y="1981200"/>
+            <a:off x="3461408" y="2812731"/>
             <a:ext cx="1492974" cy="0"/>
           </a:xfrm>
           <a:prstGeom prst="straightConnector1">
@@ -4162,13 +4216,15 @@
       <p:cxnSp>
         <p:nvCxnSpPr>
           <p:cNvPr id="37" name="Straight Arrow Connector 36"/>
-          <p:cNvCxnSpPr/>
+          <p:cNvCxnSpPr>
+            <a:cxnSpLocks/>
+          </p:cNvCxnSpPr>
           <p:nvPr/>
         </p:nvCxnSpPr>
         <p:spPr>
           <a:xfrm>
-            <a:off x="327949" y="5410200"/>
-            <a:ext cx="1196051" cy="0"/>
+            <a:off x="228600" y="5791196"/>
+            <a:ext cx="1295400" cy="4"/>
           </a:xfrm>
           <a:prstGeom prst="straightConnector1">
             <a:avLst/>
@@ -4205,8 +4261,8 @@
         </p:nvSpPr>
         <p:spPr>
           <a:xfrm>
-            <a:off x="1059753" y="1143450"/>
-            <a:ext cx="1899551" cy="677108"/>
+            <a:off x="1186922" y="2029390"/>
+            <a:ext cx="1899551" cy="292388"/>
           </a:xfrm>
           <a:prstGeom prst="rect">
             <a:avLst/>
@@ -4231,36 +4287,23 @@
           </a:lstStyle>
           <a:p>
             <a:r>
-              <a:rPr lang="en-US" sz="1000" dirty="0" err="1"/>
-              <a:t>parseCommand</a:t>
-            </a:r>
-            <a:r>
-              <a:rPr lang="en-US" sz="1000" dirty="0"/>
-              <a:t>(</a:t>
-            </a:r>
-          </a:p>
-          <a:p>
-            <a:r>
-              <a:rPr lang="en-US" sz="1000" dirty="0"/>
-              <a:t>“&lt;</a:t>
-            </a:r>
-            <a:r>
-              <a:rPr lang="en-US" sz="1000" dirty="0" err="1"/>
+              <a:rPr lang="en-US" sz="950" dirty="0"/>
+              <a:t>parse(“&lt;</a:t>
+            </a:r>
+            <a:r>
+              <a:rPr lang="en-US" sz="950" dirty="0" err="1"/>
               <a:t>cmd</a:t>
             </a:r>
             <a:r>
-              <a:rPr lang="en-US" sz="1000" dirty="0"/>
+              <a:rPr lang="en-US" sz="950" dirty="0"/>
               <a:t>&gt; &lt;preamble&gt;</a:t>
             </a:r>
           </a:p>
           <a:p>
             <a:r>
-              <a:rPr lang="en-US" sz="1000" dirty="0"/>
+              <a:rPr lang="en-US" sz="950" dirty="0"/>
               <a:t>&lt;arguments&gt;”)</a:t>
             </a:r>
-          </a:p>
-          <a:p>
-            <a:endParaRPr lang="en-US" dirty="0"/>
           </a:p>
         </p:txBody>
       </p:sp>
@@ -4272,7 +4315,7 @@
         </p:nvSpPr>
         <p:spPr>
           <a:xfrm>
-            <a:off x="4326900" y="533400"/>
+            <a:off x="4303782" y="1627568"/>
             <a:ext cx="1268533" cy="527790"/>
           </a:xfrm>
           <a:prstGeom prst="rect">
@@ -4350,8 +4393,8 @@
         </p:nvCxnSpPr>
         <p:spPr>
           <a:xfrm>
-            <a:off x="1693653" y="1620450"/>
-            <a:ext cx="1609005" cy="7834"/>
+            <a:off x="1600109" y="1548518"/>
+            <a:ext cx="1073179" cy="0"/>
           </a:xfrm>
           <a:prstGeom prst="straightConnector1">
             <a:avLst/>
@@ -4392,7 +4435,7 @@
         </p:nvSpPr>
         <p:spPr>
           <a:xfrm>
-            <a:off x="2838411" y="1484795"/>
+            <a:off x="2812796" y="2303279"/>
             <a:ext cx="1899551" cy="153888"/>
           </a:xfrm>
           <a:prstGeom prst="rect">
@@ -4443,8 +4486,8 @@
         </p:nvSpPr>
         <p:spPr>
           <a:xfrm>
-            <a:off x="2392564" y="1833981"/>
-            <a:ext cx="1899551" cy="153888"/>
+            <a:off x="3839337" y="2665512"/>
+            <a:ext cx="452778" cy="153888"/>
           </a:xfrm>
           <a:prstGeom prst="rect">
             <a:avLst/>
@@ -4492,8 +4535,8 @@
         </p:nvCxnSpPr>
         <p:spPr>
           <a:xfrm>
-            <a:off x="1707084" y="5237547"/>
-            <a:ext cx="1649921" cy="0"/>
+            <a:off x="1642082" y="5618547"/>
+            <a:ext cx="1714923" cy="0"/>
           </a:xfrm>
           <a:prstGeom prst="straightConnector1">
             <a:avLst/>
@@ -4536,7 +4579,7 @@
         </p:nvSpPr>
         <p:spPr>
           <a:xfrm rot="5400000">
-            <a:off x="1069501" y="2083002"/>
+            <a:off x="1083131" y="2848473"/>
             <a:ext cx="262473" cy="488223"/>
           </a:xfrm>
           <a:prstGeom prst="snip1Rect">
@@ -4587,7 +4630,7 @@
         </p:nvSpPr>
         <p:spPr>
           <a:xfrm>
-            <a:off x="1237356" y="2239510"/>
+            <a:off x="1112678" y="2962822"/>
             <a:ext cx="2060780" cy="169277"/>
           </a:xfrm>
           <a:prstGeom prst="rect">
@@ -4637,7 +4680,7 @@
         </p:nvCxnSpPr>
         <p:spPr>
           <a:xfrm>
-            <a:off x="953256" y="3614406"/>
+            <a:off x="953256" y="4194284"/>
             <a:ext cx="6982860" cy="0"/>
           </a:xfrm>
           <a:prstGeom prst="line">
@@ -4676,7 +4719,7 @@
         </p:nvSpPr>
         <p:spPr>
           <a:xfrm>
-            <a:off x="1694392" y="3711756"/>
+            <a:off x="1694392" y="4092756"/>
             <a:ext cx="507661" cy="169277"/>
           </a:xfrm>
           <a:prstGeom prst="rect">
@@ -4722,7 +4765,7 @@
         </p:nvSpPr>
         <p:spPr>
           <a:xfrm>
-            <a:off x="5673634" y="2385660"/>
+            <a:off x="5666825" y="3014371"/>
             <a:ext cx="1412966" cy="357540"/>
           </a:xfrm>
           <a:prstGeom prst="rect">
@@ -4817,7 +4860,7 @@
         </p:nvCxnSpPr>
         <p:spPr>
           <a:xfrm>
-            <a:off x="6380117" y="2743200"/>
+            <a:off x="6373308" y="3371911"/>
             <a:ext cx="0" cy="736300"/>
           </a:xfrm>
           <a:prstGeom prst="line">
@@ -4862,7 +4905,7 @@
         </p:nvCxnSpPr>
         <p:spPr>
           <a:xfrm>
-            <a:off x="3341086" y="2582986"/>
+            <a:off x="3341086" y="3200400"/>
             <a:ext cx="2325739" cy="0"/>
           </a:xfrm>
           <a:prstGeom prst="straightConnector1">
@@ -4906,7 +4949,7 @@
         </p:nvCxnSpPr>
         <p:spPr>
           <a:xfrm>
-            <a:off x="3488273" y="3319287"/>
+            <a:off x="3488273" y="3886200"/>
             <a:ext cx="2899552" cy="0"/>
           </a:xfrm>
           <a:prstGeom prst="straightConnector1">
@@ -4950,7 +4993,7 @@
         </p:nvSpPr>
         <p:spPr>
           <a:xfrm>
-            <a:off x="5803849" y="3760907"/>
+            <a:off x="5803849" y="4141907"/>
             <a:ext cx="1412966" cy="370184"/>
           </a:xfrm>
           <a:prstGeom prst="rect">
@@ -5058,7 +5101,7 @@
         </p:nvCxnSpPr>
         <p:spPr>
           <a:xfrm>
-            <a:off x="6510332" y="4131091"/>
+            <a:off x="6510332" y="4512091"/>
             <a:ext cx="0" cy="821909"/>
           </a:xfrm>
           <a:prstGeom prst="line">
@@ -5103,7 +5146,7 @@
         </p:nvCxnSpPr>
         <p:spPr>
           <a:xfrm>
-            <a:off x="3456886" y="3952380"/>
+            <a:off x="3456886" y="4333380"/>
             <a:ext cx="2362042" cy="0"/>
           </a:xfrm>
           <a:prstGeom prst="straightConnector1">
@@ -5147,7 +5190,7 @@
         </p:nvCxnSpPr>
         <p:spPr>
           <a:xfrm>
-            <a:off x="3488273" y="4688681"/>
+            <a:off x="3488273" y="5069681"/>
             <a:ext cx="3051655" cy="0"/>
           </a:xfrm>
           <a:prstGeom prst="straightConnector1">
@@ -5191,7 +5234,7 @@
         </p:nvSpPr>
         <p:spPr>
           <a:xfrm>
-            <a:off x="862286" y="5071482"/>
+            <a:off x="862286" y="5452482"/>
             <a:ext cx="1899551" cy="153888"/>
           </a:xfrm>
           <a:prstGeom prst="rect">
@@ -5225,10 +5268,10 @@
       </p:sp>
       <p:sp>
         <p:nvSpPr>
-          <p:cNvPr id="101" name="Rectangle 100">
+          <p:cNvPr id="102" name="Rectangle 101">
             <a:extLst>
               <a:ext uri="{FF2B5EF4-FFF2-40B4-BE49-F238E27FC236}">
-                <a16:creationId xmlns:a16="http://schemas.microsoft.com/office/drawing/2014/main" id="{0A249BCB-B5C1-D44A-BFB7-7C78425A4713}"/>
+                <a16:creationId xmlns:a16="http://schemas.microsoft.com/office/drawing/2014/main" id="{8C463D05-3DC5-7945-9C16-CA6B166655AF}"/>
               </a:ext>
             </a:extLst>
           </p:cNvPr>
@@ -5237,8 +5280,8 @@
         </p:nvSpPr>
         <p:spPr>
           <a:xfrm>
-            <a:off x="6300954" y="2726104"/>
-            <a:ext cx="158326" cy="591782"/>
+            <a:off x="6420492" y="4519825"/>
+            <a:ext cx="181959" cy="546573"/>
           </a:xfrm>
           <a:prstGeom prst="rect">
             <a:avLst/>
@@ -5278,59 +5321,6 @@
       </p:sp>
       <p:sp>
         <p:nvSpPr>
-          <p:cNvPr id="102" name="Rectangle 101">
-            <a:extLst>
-              <a:ext uri="{FF2B5EF4-FFF2-40B4-BE49-F238E27FC236}">
-                <a16:creationId xmlns:a16="http://schemas.microsoft.com/office/drawing/2014/main" id="{8C463D05-3DC5-7945-9C16-CA6B166655AF}"/>
-              </a:ext>
-            </a:extLst>
-          </p:cNvPr>
-          <p:cNvSpPr/>
-          <p:nvPr/>
-        </p:nvSpPr>
-        <p:spPr>
-          <a:xfrm>
-            <a:off x="6420492" y="4138825"/>
-            <a:ext cx="181959" cy="546573"/>
-          </a:xfrm>
-          <a:prstGeom prst="rect">
-            <a:avLst/>
-          </a:prstGeom>
-          <a:solidFill>
-            <a:srgbClr val="0070C0"/>
-          </a:solidFill>
-          <a:ln>
-            <a:solidFill>
-              <a:srgbClr val="0070C0"/>
-            </a:solidFill>
-          </a:ln>
-          <a:effectLst/>
-        </p:spPr>
-        <p:style>
-          <a:lnRef idx="1">
-            <a:schemeClr val="accent3"/>
-          </a:lnRef>
-          <a:fillRef idx="2">
-            <a:schemeClr val="accent3"/>
-          </a:fillRef>
-          <a:effectRef idx="1">
-            <a:schemeClr val="accent3"/>
-          </a:effectRef>
-          <a:fontRef idx="minor">
-            <a:schemeClr val="dk1"/>
-          </a:fontRef>
-        </p:style>
-        <p:txBody>
-          <a:bodyPr rtlCol="0" anchor="ctr"/>
-          <a:lstStyle/>
-          <a:p>
-            <a:pPr algn="ctr"/>
-            <a:endParaRPr lang="en-SG" sz="1400"/>
-          </a:p>
-        </p:txBody>
-      </p:sp>
-      <p:sp>
-        <p:nvSpPr>
           <p:cNvPr id="112" name="TextBox 111">
             <a:extLst>
               <a:ext uri="{FF2B5EF4-FFF2-40B4-BE49-F238E27FC236}">
@@ -5343,8 +5333,8 @@
         </p:nvSpPr>
         <p:spPr>
           <a:xfrm>
-            <a:off x="-614820" y="5259516"/>
-            <a:ext cx="1899551" cy="153888"/>
+            <a:off x="564561" y="5580177"/>
+            <a:ext cx="719488" cy="153888"/>
           </a:xfrm>
           <a:prstGeom prst="rect">
             <a:avLst/>
@@ -5375,6 +5365,149 @@
           </a:p>
         </p:txBody>
       </p:sp>
+      <p:sp>
+        <p:nvSpPr>
+          <p:cNvPr id="125" name="Rectangle 124">
+            <a:extLst>
+              <a:ext uri="{FF2B5EF4-FFF2-40B4-BE49-F238E27FC236}">
+                <a16:creationId xmlns:a16="http://schemas.microsoft.com/office/drawing/2014/main" id="{87D2402F-3AC1-9E42-8DDE-B78CB41A7750}"/>
+              </a:ext>
+            </a:extLst>
+          </p:cNvPr>
+          <p:cNvSpPr/>
+          <p:nvPr/>
+        </p:nvSpPr>
+        <p:spPr>
+          <a:xfrm>
+            <a:off x="3307709" y="1737591"/>
+            <a:ext cx="180562" cy="160399"/>
+          </a:xfrm>
+          <a:prstGeom prst="rect">
+            <a:avLst/>
+          </a:prstGeom>
+          <a:solidFill>
+            <a:srgbClr val="0070C0"/>
+          </a:solidFill>
+          <a:ln>
+            <a:solidFill>
+              <a:srgbClr val="0070C0"/>
+            </a:solidFill>
+          </a:ln>
+          <a:effectLst/>
+        </p:spPr>
+        <p:style>
+          <a:lnRef idx="1">
+            <a:schemeClr val="accent3"/>
+          </a:lnRef>
+          <a:fillRef idx="2">
+            <a:schemeClr val="accent3"/>
+          </a:fillRef>
+          <a:effectRef idx="1">
+            <a:schemeClr val="accent3"/>
+          </a:effectRef>
+          <a:fontRef idx="minor">
+            <a:schemeClr val="dk1"/>
+          </a:fontRef>
+        </p:style>
+        <p:txBody>
+          <a:bodyPr rtlCol="0" anchor="ctr"/>
+          <a:lstStyle/>
+          <a:p>
+            <a:pPr algn="ctr"/>
+            <a:endParaRPr lang="en-SG" sz="1400"/>
+          </a:p>
+        </p:txBody>
+      </p:sp>
+      <p:cxnSp>
+        <p:nvCxnSpPr>
+          <p:cNvPr id="126" name="Straight Arrow Connector 125">
+            <a:extLst>
+              <a:ext uri="{FF2B5EF4-FFF2-40B4-BE49-F238E27FC236}">
+                <a16:creationId xmlns:a16="http://schemas.microsoft.com/office/drawing/2014/main" id="{C072857D-886F-CE4D-97B7-4C3A3DC4859F}"/>
+              </a:ext>
+            </a:extLst>
+          </p:cNvPr>
+          <p:cNvCxnSpPr>
+            <a:cxnSpLocks/>
+          </p:cNvCxnSpPr>
+          <p:nvPr/>
+        </p:nvCxnSpPr>
+        <p:spPr>
+          <a:xfrm>
+            <a:off x="1650298" y="1897990"/>
+            <a:ext cx="1690788" cy="1"/>
+          </a:xfrm>
+          <a:prstGeom prst="straightConnector1">
+            <a:avLst/>
+          </a:prstGeom>
+          <a:ln w="19050">
+            <a:solidFill>
+              <a:srgbClr val="0070C0"/>
+            </a:solidFill>
+            <a:prstDash val="sysDash"/>
+            <a:headEnd type="arrow" w="med" len="med"/>
+            <a:tailEnd type="none" w="med" len="med"/>
+          </a:ln>
+        </p:spPr>
+        <p:style>
+          <a:lnRef idx="1">
+            <a:schemeClr val="accent1"/>
+          </a:lnRef>
+          <a:fillRef idx="0">
+            <a:schemeClr val="accent1"/>
+          </a:fillRef>
+          <a:effectRef idx="0">
+            <a:schemeClr val="accent1"/>
+          </a:effectRef>
+          <a:fontRef idx="minor">
+            <a:schemeClr val="tx1"/>
+          </a:fontRef>
+        </p:style>
+      </p:cxnSp>
+      <p:cxnSp>
+        <p:nvCxnSpPr>
+          <p:cNvPr id="129" name="Straight Arrow Connector 128">
+            <a:extLst>
+              <a:ext uri="{FF2B5EF4-FFF2-40B4-BE49-F238E27FC236}">
+                <a16:creationId xmlns:a16="http://schemas.microsoft.com/office/drawing/2014/main" id="{C2CBEB53-0E78-7A40-8B9E-55D04E70A33D}"/>
+              </a:ext>
+            </a:extLst>
+          </p:cNvPr>
+          <p:cNvCxnSpPr>
+            <a:cxnSpLocks/>
+          </p:cNvCxnSpPr>
+          <p:nvPr/>
+        </p:nvCxnSpPr>
+        <p:spPr>
+          <a:xfrm>
+            <a:off x="1661774" y="2328797"/>
+            <a:ext cx="1655730" cy="0"/>
+          </a:xfrm>
+          <a:prstGeom prst="straightConnector1">
+            <a:avLst/>
+          </a:prstGeom>
+          <a:ln w="19050">
+            <a:solidFill>
+              <a:srgbClr val="0070C0"/>
+            </a:solidFill>
+            <a:tailEnd type="arrow"/>
+          </a:ln>
+        </p:spPr>
+        <p:style>
+          <a:lnRef idx="1">
+            <a:schemeClr val="accent1"/>
+          </a:lnRef>
+          <a:fillRef idx="0">
+            <a:schemeClr val="accent1"/>
+          </a:fillRef>
+          <a:effectRef idx="0">
+            <a:schemeClr val="accent1"/>
+          </a:effectRef>
+          <a:fontRef idx="minor">
+            <a:schemeClr val="tx1"/>
+          </a:fontRef>
+        </p:style>
+      </p:cxnSp>
     </p:spTree>
     <p:extLst>
       <p:ext uri="{BB962C8B-B14F-4D97-AF65-F5344CB8AC3E}">

</xml_diff>

<commit_message>
Update the by name command sequence diagram.
</commit_message>
<xml_diff>
--- a/docs/diagrams/ByNameCommandSequenceDiagram.pptx
+++ b/docs/diagrams/ByNameCommandSequenceDiagram.pptx
@@ -3503,7 +3503,7 @@
         </p:nvSpPr>
         <p:spPr>
           <a:xfrm>
-            <a:off x="379681" y="115757"/>
+            <a:off x="379681" y="76200"/>
             <a:ext cx="7769448" cy="6361231"/>
           </a:xfrm>
           <a:prstGeom prst="roundRect">
@@ -4993,7 +4993,7 @@
         </p:nvSpPr>
         <p:spPr>
           <a:xfrm>
-            <a:off x="5803849" y="4141907"/>
+            <a:off x="5803849" y="4253826"/>
             <a:ext cx="1412966" cy="370184"/>
           </a:xfrm>
           <a:prstGeom prst="rect">
@@ -5095,13 +5095,12 @@
           </p:cNvPr>
           <p:cNvCxnSpPr>
             <a:cxnSpLocks/>
-            <a:stCxn id="90" idx="2"/>
           </p:cNvCxnSpPr>
           <p:nvPr/>
         </p:nvCxnSpPr>
         <p:spPr>
           <a:xfrm>
-            <a:off x="6510332" y="4512091"/>
+            <a:off x="6510332" y="4532443"/>
             <a:ext cx="0" cy="821909"/>
           </a:xfrm>
           <a:prstGeom prst="line">
@@ -5146,7 +5145,7 @@
         </p:nvCxnSpPr>
         <p:spPr>
           <a:xfrm>
-            <a:off x="3456886" y="4333380"/>
+            <a:off x="3456886" y="4445299"/>
             <a:ext cx="2362042" cy="0"/>
           </a:xfrm>
           <a:prstGeom prst="straightConnector1">
@@ -5190,7 +5189,7 @@
         </p:nvCxnSpPr>
         <p:spPr>
           <a:xfrm>
-            <a:off x="3488273" y="5069681"/>
+            <a:off x="3488273" y="5181600"/>
             <a:ext cx="3051655" cy="0"/>
           </a:xfrm>
           <a:prstGeom prst="straightConnector1">
@@ -5280,7 +5279,7 @@
         </p:nvSpPr>
         <p:spPr>
           <a:xfrm>
-            <a:off x="6420492" y="4519825"/>
+            <a:off x="6420492" y="4631744"/>
             <a:ext cx="181959" cy="546573"/>
           </a:xfrm>
           <a:prstGeom prst="rect">

</xml_diff>